<commit_message>
add cross validation in ppt
</commit_message>
<xml_diff>
--- a/sklearn_preprocessing.pptx
+++ b/sklearn_preprocessing.pptx
@@ -8,6 +8,7 @@
     <p:sldId id="256" r:id="rId2"/>
     <p:sldId id="257" r:id="rId3"/>
     <p:sldId id="258" r:id="rId4"/>
+    <p:sldId id="259" r:id="rId5"/>
   </p:sldIdLst>
   <p:sldSz cx="12192000" cy="6858000"/>
   <p:notesSz cx="6858000" cy="9144000"/>
@@ -106,6 +107,11 @@
       </a:defRPr>
     </a:lvl9pPr>
   </p:defaultTextStyle>
+  <p:extLst>
+    <p:ext uri="{EFAFB233-063F-42B5-8137-9DF3F51BA10A}">
+      <p15:sldGuideLst xmlns:p15="http://schemas.microsoft.com/office/powerpoint/2012/main"/>
+    </p:ext>
+  </p:extLst>
 </p:presentation>
 </file>
 
@@ -256,7 +262,7 @@
           <a:p>
             <a:fld id="{737C4156-E156-4F69-97B0-6854103C512A}" type="datetimeFigureOut">
               <a:rPr lang="zh-CN" altLang="en-US" smtClean="0"/>
-              <a:t>2018/8/5</a:t>
+              <a:t>2018/8/6</a:t>
             </a:fld>
             <a:endParaRPr lang="zh-CN" altLang="en-US"/>
           </a:p>
@@ -454,7 +460,7 @@
           <a:p>
             <a:fld id="{737C4156-E156-4F69-97B0-6854103C512A}" type="datetimeFigureOut">
               <a:rPr lang="zh-CN" altLang="en-US" smtClean="0"/>
-              <a:t>2018/8/5</a:t>
+              <a:t>2018/8/6</a:t>
             </a:fld>
             <a:endParaRPr lang="zh-CN" altLang="en-US"/>
           </a:p>
@@ -662,7 +668,7 @@
           <a:p>
             <a:fld id="{737C4156-E156-4F69-97B0-6854103C512A}" type="datetimeFigureOut">
               <a:rPr lang="zh-CN" altLang="en-US" smtClean="0"/>
-              <a:t>2018/8/5</a:t>
+              <a:t>2018/8/6</a:t>
             </a:fld>
             <a:endParaRPr lang="zh-CN" altLang="en-US"/>
           </a:p>
@@ -860,7 +866,7 @@
           <a:p>
             <a:fld id="{737C4156-E156-4F69-97B0-6854103C512A}" type="datetimeFigureOut">
               <a:rPr lang="zh-CN" altLang="en-US" smtClean="0"/>
-              <a:t>2018/8/5</a:t>
+              <a:t>2018/8/6</a:t>
             </a:fld>
             <a:endParaRPr lang="zh-CN" altLang="en-US"/>
           </a:p>
@@ -1135,7 +1141,7 @@
           <a:p>
             <a:fld id="{737C4156-E156-4F69-97B0-6854103C512A}" type="datetimeFigureOut">
               <a:rPr lang="zh-CN" altLang="en-US" smtClean="0"/>
-              <a:t>2018/8/5</a:t>
+              <a:t>2018/8/6</a:t>
             </a:fld>
             <a:endParaRPr lang="zh-CN" altLang="en-US"/>
           </a:p>
@@ -1400,7 +1406,7 @@
           <a:p>
             <a:fld id="{737C4156-E156-4F69-97B0-6854103C512A}" type="datetimeFigureOut">
               <a:rPr lang="zh-CN" altLang="en-US" smtClean="0"/>
-              <a:t>2018/8/5</a:t>
+              <a:t>2018/8/6</a:t>
             </a:fld>
             <a:endParaRPr lang="zh-CN" altLang="en-US"/>
           </a:p>
@@ -1812,7 +1818,7 @@
           <a:p>
             <a:fld id="{737C4156-E156-4F69-97B0-6854103C512A}" type="datetimeFigureOut">
               <a:rPr lang="zh-CN" altLang="en-US" smtClean="0"/>
-              <a:t>2018/8/5</a:t>
+              <a:t>2018/8/6</a:t>
             </a:fld>
             <a:endParaRPr lang="zh-CN" altLang="en-US"/>
           </a:p>
@@ -1953,7 +1959,7 @@
           <a:p>
             <a:fld id="{737C4156-E156-4F69-97B0-6854103C512A}" type="datetimeFigureOut">
               <a:rPr lang="zh-CN" altLang="en-US" smtClean="0"/>
-              <a:t>2018/8/5</a:t>
+              <a:t>2018/8/6</a:t>
             </a:fld>
             <a:endParaRPr lang="zh-CN" altLang="en-US"/>
           </a:p>
@@ -2066,7 +2072,7 @@
           <a:p>
             <a:fld id="{737C4156-E156-4F69-97B0-6854103C512A}" type="datetimeFigureOut">
               <a:rPr lang="zh-CN" altLang="en-US" smtClean="0"/>
-              <a:t>2018/8/5</a:t>
+              <a:t>2018/8/6</a:t>
             </a:fld>
             <a:endParaRPr lang="zh-CN" altLang="en-US"/>
           </a:p>
@@ -2377,7 +2383,7 @@
           <a:p>
             <a:fld id="{737C4156-E156-4F69-97B0-6854103C512A}" type="datetimeFigureOut">
               <a:rPr lang="zh-CN" altLang="en-US" smtClean="0"/>
-              <a:t>2018/8/5</a:t>
+              <a:t>2018/8/6</a:t>
             </a:fld>
             <a:endParaRPr lang="zh-CN" altLang="en-US"/>
           </a:p>
@@ -2665,7 +2671,7 @@
           <a:p>
             <a:fld id="{737C4156-E156-4F69-97B0-6854103C512A}" type="datetimeFigureOut">
               <a:rPr lang="zh-CN" altLang="en-US" smtClean="0"/>
-              <a:t>2018/8/5</a:t>
+              <a:t>2018/8/6</a:t>
             </a:fld>
             <a:endParaRPr lang="zh-CN" altLang="en-US"/>
           </a:p>
@@ -2906,7 +2912,7 @@
           <a:p>
             <a:fld id="{737C4156-E156-4F69-97B0-6854103C512A}" type="datetimeFigureOut">
               <a:rPr lang="zh-CN" altLang="en-US" smtClean="0"/>
-              <a:t>2018/8/5</a:t>
+              <a:t>2018/8/6</a:t>
             </a:fld>
             <a:endParaRPr lang="zh-CN" altLang="en-US"/>
           </a:p>
@@ -4922,6 +4928,649 @@
 </p:sld>
 </file>
 
+<file path=ppt/slides/slide4.xml><?xml version="1.0" encoding="utf-8"?>
+<p:sld xmlns:a="http://schemas.openxmlformats.org/drawingml/2006/main" xmlns:r="http://schemas.openxmlformats.org/officeDocument/2006/relationships" xmlns:p="http://schemas.openxmlformats.org/presentationml/2006/main">
+  <p:cSld>
+    <p:spTree>
+      <p:nvGrpSpPr>
+        <p:cNvPr id="1" name=""/>
+        <p:cNvGrpSpPr/>
+        <p:nvPr/>
+      </p:nvGrpSpPr>
+      <p:grpSpPr>
+        <a:xfrm>
+          <a:off x="0" y="0"/>
+          <a:ext cx="0" cy="0"/>
+          <a:chOff x="0" y="0"/>
+          <a:chExt cx="0" cy="0"/>
+        </a:xfrm>
+      </p:grpSpPr>
+      <p:sp>
+        <p:nvSpPr>
+          <p:cNvPr id="2" name="标题 1">
+            <a:extLst>
+              <a:ext uri="{FF2B5EF4-FFF2-40B4-BE49-F238E27FC236}">
+                <a16:creationId xmlns:a16="http://schemas.microsoft.com/office/drawing/2014/main" id="{C87A2854-E83E-408D-878E-2CFD7171431F}"/>
+              </a:ext>
+            </a:extLst>
+          </p:cNvPr>
+          <p:cNvSpPr>
+            <a:spLocks noGrp="1"/>
+          </p:cNvSpPr>
+          <p:nvPr>
+            <p:ph type="title"/>
+          </p:nvPr>
+        </p:nvSpPr>
+        <p:spPr/>
+        <p:txBody>
+          <a:bodyPr/>
+          <a:lstStyle/>
+          <a:p>
+            <a:r>
+              <a:rPr lang="en-US" altLang="zh-CN" dirty="0" err="1"/>
+              <a:t>Kfold</a:t>
+            </a:r>
+            <a:r>
+              <a:rPr lang="en-US" altLang="zh-CN" dirty="0"/>
+              <a:t> </a:t>
+            </a:r>
+            <a:r>
+              <a:rPr lang="en-US" altLang="zh-CN" dirty="0" err="1"/>
+              <a:t>crossvalidation</a:t>
+            </a:r>
+            <a:endParaRPr lang="zh-CN" altLang="en-US" dirty="0"/>
+          </a:p>
+        </p:txBody>
+      </p:sp>
+      <p:sp>
+        <p:nvSpPr>
+          <p:cNvPr id="4" name="矩形 3">
+            <a:extLst>
+              <a:ext uri="{FF2B5EF4-FFF2-40B4-BE49-F238E27FC236}">
+                <a16:creationId xmlns:a16="http://schemas.microsoft.com/office/drawing/2014/main" id="{D041E806-69F4-443B-91E1-94655515A0D6}"/>
+              </a:ext>
+            </a:extLst>
+          </p:cNvPr>
+          <p:cNvSpPr/>
+          <p:nvPr/>
+        </p:nvSpPr>
+        <p:spPr>
+          <a:xfrm>
+            <a:off x="838200" y="1401285"/>
+            <a:ext cx="7288763" cy="4812903"/>
+          </a:xfrm>
+          <a:prstGeom prst="rect">
+            <a:avLst/>
+          </a:prstGeom>
+        </p:spPr>
+        <p:style>
+          <a:lnRef idx="2">
+            <a:schemeClr val="accent1">
+              <a:shade val="50000"/>
+            </a:schemeClr>
+          </a:lnRef>
+          <a:fillRef idx="1">
+            <a:schemeClr val="accent1"/>
+          </a:fillRef>
+          <a:effectRef idx="0">
+            <a:schemeClr val="accent1"/>
+          </a:effectRef>
+          <a:fontRef idx="minor">
+            <a:schemeClr val="lt1"/>
+          </a:fontRef>
+        </p:style>
+        <p:txBody>
+          <a:bodyPr rtlCol="0" anchor="ctr"/>
+          <a:lstStyle/>
+          <a:p>
+            <a:r>
+              <a:rPr lang="en-US" altLang="zh-CN" sz="1600" dirty="0">
+                <a:solidFill>
+                  <a:schemeClr val="tx1">
+                    <a:lumMod val="65000"/>
+                    <a:lumOff val="35000"/>
+                  </a:schemeClr>
+                </a:solidFill>
+                <a:latin typeface="Consolas" panose="020B0609020204030204" pitchFamily="49" charset="0"/>
+              </a:rPr>
+              <a:t># import functions</a:t>
+            </a:r>
+          </a:p>
+          <a:p>
+            <a:r>
+              <a:rPr lang="en-US" altLang="zh-CN" sz="1600" dirty="0">
+                <a:latin typeface="Consolas" panose="020B0609020204030204" pitchFamily="49" charset="0"/>
+              </a:rPr>
+              <a:t>[1]: import </a:t>
+            </a:r>
+            <a:r>
+              <a:rPr lang="en-US" altLang="zh-CN" sz="1600" dirty="0" err="1">
+                <a:latin typeface="Consolas" panose="020B0609020204030204" pitchFamily="49" charset="0"/>
+              </a:rPr>
+              <a:t>numpy</a:t>
+            </a:r>
+            <a:r>
+              <a:rPr lang="en-US" altLang="zh-CN" sz="1600" dirty="0">
+                <a:latin typeface="Consolas" panose="020B0609020204030204" pitchFamily="49" charset="0"/>
+              </a:rPr>
+              <a:t> as np </a:t>
+            </a:r>
+          </a:p>
+          <a:p>
+            <a:r>
+              <a:rPr lang="en-US" altLang="zh-CN" sz="1600" dirty="0">
+                <a:latin typeface="Consolas" panose="020B0609020204030204" pitchFamily="49" charset="0"/>
+              </a:rPr>
+              <a:t>[2]: from </a:t>
+            </a:r>
+            <a:r>
+              <a:rPr lang="en-US" altLang="zh-CN" sz="1600" dirty="0" err="1">
+                <a:latin typeface="Consolas" panose="020B0609020204030204" pitchFamily="49" charset="0"/>
+              </a:rPr>
+              <a:t>sklearn.preprocessing</a:t>
+            </a:r>
+            <a:r>
+              <a:rPr lang="en-US" altLang="zh-CN" sz="1600" dirty="0">
+                <a:latin typeface="Consolas" panose="020B0609020204030204" pitchFamily="49" charset="0"/>
+              </a:rPr>
+              <a:t> import </a:t>
+            </a:r>
+            <a:r>
+              <a:rPr lang="en-US" altLang="zh-CN" sz="1600" dirty="0" err="1">
+                <a:latin typeface="Consolas" panose="020B0609020204030204" pitchFamily="49" charset="0"/>
+              </a:rPr>
+              <a:t>StandardScaler</a:t>
+            </a:r>
+            <a:endParaRPr lang="en-US" altLang="zh-CN" sz="1600" dirty="0">
+              <a:latin typeface="Consolas" panose="020B0609020204030204" pitchFamily="49" charset="0"/>
+            </a:endParaRPr>
+          </a:p>
+          <a:p>
+            <a:r>
+              <a:rPr lang="en-US" altLang="zh-CN" sz="1600" dirty="0">
+                <a:latin typeface="Consolas" panose="020B0609020204030204" pitchFamily="49" charset="0"/>
+              </a:rPr>
+              <a:t>[3]: from </a:t>
+            </a:r>
+            <a:r>
+              <a:rPr lang="en-US" altLang="zh-CN" sz="1600" dirty="0" err="1">
+                <a:latin typeface="Consolas" panose="020B0609020204030204" pitchFamily="49" charset="0"/>
+              </a:rPr>
+              <a:t>sklearn.pipeline</a:t>
+            </a:r>
+            <a:r>
+              <a:rPr lang="en-US" altLang="zh-CN" sz="1600" dirty="0">
+                <a:latin typeface="Consolas" panose="020B0609020204030204" pitchFamily="49" charset="0"/>
+              </a:rPr>
+              <a:t> import Pipeline</a:t>
+            </a:r>
+          </a:p>
+          <a:p>
+            <a:r>
+              <a:rPr lang="en-US" altLang="zh-CN" sz="1600" dirty="0">
+                <a:latin typeface="Consolas" panose="020B0609020204030204" pitchFamily="49" charset="0"/>
+              </a:rPr>
+              <a:t>[4]: from </a:t>
+            </a:r>
+            <a:r>
+              <a:rPr lang="en-US" altLang="zh-CN" sz="1600" dirty="0" err="1">
+                <a:latin typeface="Consolas" panose="020B0609020204030204" pitchFamily="49" charset="0"/>
+              </a:rPr>
+              <a:t>sklearn.model_selection</a:t>
+            </a:r>
+            <a:r>
+              <a:rPr lang="en-US" altLang="zh-CN" sz="1600" dirty="0">
+                <a:latin typeface="Consolas" panose="020B0609020204030204" pitchFamily="49" charset="0"/>
+              </a:rPr>
+              <a:t> import </a:t>
+            </a:r>
+            <a:r>
+              <a:rPr lang="en-US" altLang="zh-CN" sz="1600" dirty="0" err="1">
+                <a:latin typeface="Consolas" panose="020B0609020204030204" pitchFamily="49" charset="0"/>
+              </a:rPr>
+              <a:t>KFold</a:t>
+            </a:r>
+            <a:endParaRPr lang="en-US" altLang="zh-CN" sz="1600" dirty="0">
+              <a:latin typeface="Consolas" panose="020B0609020204030204" pitchFamily="49" charset="0"/>
+            </a:endParaRPr>
+          </a:p>
+          <a:p>
+            <a:r>
+              <a:rPr lang="en-US" altLang="zh-CN" sz="1600" dirty="0">
+                <a:latin typeface="Consolas" panose="020B0609020204030204" pitchFamily="49" charset="0"/>
+              </a:rPr>
+              <a:t>[5]: from </a:t>
+            </a:r>
+            <a:r>
+              <a:rPr lang="en-US" altLang="zh-CN" sz="1600" dirty="0" err="1">
+                <a:latin typeface="Consolas" panose="020B0609020204030204" pitchFamily="49" charset="0"/>
+              </a:rPr>
+              <a:t>sklearn.model_selection</a:t>
+            </a:r>
+            <a:r>
+              <a:rPr lang="en-US" altLang="zh-CN" sz="1600" dirty="0">
+                <a:latin typeface="Consolas" panose="020B0609020204030204" pitchFamily="49" charset="0"/>
+              </a:rPr>
+              <a:t> import </a:t>
+            </a:r>
+            <a:r>
+              <a:rPr lang="en-US" altLang="zh-CN" sz="1600" dirty="0" err="1">
+                <a:latin typeface="Consolas" panose="020B0609020204030204" pitchFamily="49" charset="0"/>
+              </a:rPr>
+              <a:t>cross_val_score</a:t>
+            </a:r>
+            <a:endParaRPr lang="en-US" altLang="zh-CN" sz="1600" dirty="0">
+              <a:latin typeface="Consolas" panose="020B0609020204030204" pitchFamily="49" charset="0"/>
+            </a:endParaRPr>
+          </a:p>
+          <a:p>
+            <a:r>
+              <a:rPr lang="en-US" altLang="zh-CN" sz="1600" dirty="0">
+                <a:latin typeface="Consolas" panose="020B0609020204030204" pitchFamily="49" charset="0"/>
+              </a:rPr>
+              <a:t>[6]: from </a:t>
+            </a:r>
+            <a:r>
+              <a:rPr lang="en-US" altLang="zh-CN" sz="1600" dirty="0" err="1">
+                <a:latin typeface="Consolas" panose="020B0609020204030204" pitchFamily="49" charset="0"/>
+              </a:rPr>
+              <a:t>sklearn.linear_models</a:t>
+            </a:r>
+            <a:r>
+              <a:rPr lang="en-US" altLang="zh-CN" sz="1600" dirty="0">
+                <a:latin typeface="Consolas" panose="020B0609020204030204" pitchFamily="49" charset="0"/>
+              </a:rPr>
+              <a:t> import </a:t>
+            </a:r>
+            <a:r>
+              <a:rPr lang="en-US" altLang="zh-CN" sz="1600" dirty="0" err="1">
+                <a:latin typeface="Consolas" panose="020B0609020204030204" pitchFamily="49" charset="0"/>
+              </a:rPr>
+              <a:t>LogisticRegression</a:t>
+            </a:r>
+            <a:endParaRPr lang="en-US" altLang="zh-CN" sz="1600" dirty="0">
+              <a:latin typeface="Consolas" panose="020B0609020204030204" pitchFamily="49" charset="0"/>
+            </a:endParaRPr>
+          </a:p>
+          <a:p>
+            <a:endParaRPr lang="en-US" altLang="zh-CN" sz="1600" dirty="0">
+              <a:latin typeface="Consolas" panose="020B0609020204030204" pitchFamily="49" charset="0"/>
+            </a:endParaRPr>
+          </a:p>
+          <a:p>
+            <a:r>
+              <a:rPr lang="en-US" altLang="zh-CN" sz="1600" dirty="0">
+                <a:solidFill>
+                  <a:schemeClr val="tx1">
+                    <a:lumMod val="65000"/>
+                    <a:lumOff val="35000"/>
+                  </a:schemeClr>
+                </a:solidFill>
+                <a:latin typeface="Consolas" panose="020B0609020204030204" pitchFamily="49" charset="0"/>
+              </a:rPr>
+              <a:t># create data</a:t>
+            </a:r>
+          </a:p>
+          <a:p>
+            <a:r>
+              <a:rPr lang="en-US" altLang="zh-CN" sz="1600" dirty="0">
+                <a:latin typeface="Consolas" panose="020B0609020204030204" pitchFamily="49" charset="0"/>
+              </a:rPr>
+              <a:t>[7]: X = </a:t>
+            </a:r>
+            <a:r>
+              <a:rPr lang="en-US" altLang="zh-CN" sz="1600" dirty="0" err="1">
+                <a:latin typeface="Consolas" panose="020B0609020204030204" pitchFamily="49" charset="0"/>
+              </a:rPr>
+              <a:t>np.random.randn</a:t>
+            </a:r>
+            <a:r>
+              <a:rPr lang="en-US" altLang="zh-CN" sz="1600" dirty="0">
+                <a:latin typeface="Consolas" panose="020B0609020204030204" pitchFamily="49" charset="0"/>
+              </a:rPr>
+              <a:t>(100,2)</a:t>
+            </a:r>
+          </a:p>
+          <a:p>
+            <a:r>
+              <a:rPr lang="en-US" altLang="zh-CN" sz="1600" dirty="0">
+                <a:latin typeface="Consolas" panose="020B0609020204030204" pitchFamily="49" charset="0"/>
+              </a:rPr>
+              <a:t>[8]: y = </a:t>
+            </a:r>
+            <a:r>
+              <a:rPr lang="en-US" altLang="zh-CN" sz="1600" dirty="0" err="1">
+                <a:latin typeface="Consolas" panose="020B0609020204030204" pitchFamily="49" charset="0"/>
+              </a:rPr>
+              <a:t>np.random.randint</a:t>
+            </a:r>
+            <a:r>
+              <a:rPr lang="en-US" altLang="zh-CN" sz="1600" dirty="0">
+                <a:latin typeface="Consolas" panose="020B0609020204030204" pitchFamily="49" charset="0"/>
+              </a:rPr>
+              <a:t>(2, size = [100])</a:t>
+            </a:r>
+          </a:p>
+          <a:p>
+            <a:endParaRPr lang="en-US" altLang="zh-CN" sz="1600" dirty="0">
+              <a:latin typeface="Consolas" panose="020B0609020204030204" pitchFamily="49" charset="0"/>
+            </a:endParaRPr>
+          </a:p>
+          <a:p>
+            <a:r>
+              <a:rPr lang="en-US" altLang="zh-CN" sz="1600" dirty="0">
+                <a:solidFill>
+                  <a:schemeClr val="tx1">
+                    <a:lumMod val="65000"/>
+                    <a:lumOff val="35000"/>
+                  </a:schemeClr>
+                </a:solidFill>
+                <a:latin typeface="Consolas" panose="020B0609020204030204" pitchFamily="49" charset="0"/>
+              </a:rPr>
+              <a:t># construct model</a:t>
+            </a:r>
+          </a:p>
+          <a:p>
+            <a:r>
+              <a:rPr lang="en-US" altLang="zh-CN" sz="1600" dirty="0">
+                <a:latin typeface="Consolas" panose="020B0609020204030204" pitchFamily="49" charset="0"/>
+              </a:rPr>
+              <a:t>[9]: model = Pipeline([(‘scaler’, </a:t>
+            </a:r>
+            <a:r>
+              <a:rPr lang="en-US" altLang="zh-CN" sz="1600" dirty="0" err="1">
+                <a:latin typeface="Consolas" panose="020B0609020204030204" pitchFamily="49" charset="0"/>
+              </a:rPr>
+              <a:t>StandardScaler</a:t>
+            </a:r>
+            <a:r>
+              <a:rPr lang="en-US" altLang="zh-CN" sz="1600" dirty="0">
+                <a:latin typeface="Consolas" panose="020B0609020204030204" pitchFamily="49" charset="0"/>
+              </a:rPr>
+              <a:t>()), </a:t>
+            </a:r>
+          </a:p>
+          <a:p>
+            <a:r>
+              <a:rPr lang="en-US" altLang="zh-CN" sz="1600" dirty="0">
+                <a:latin typeface="Consolas" panose="020B0609020204030204" pitchFamily="49" charset="0"/>
+              </a:rPr>
+              <a:t>                       (‘classifier’, </a:t>
+            </a:r>
+            <a:r>
+              <a:rPr lang="en-US" altLang="zh-CN" sz="1600" dirty="0" err="1">
+                <a:latin typeface="Consolas" panose="020B0609020204030204" pitchFamily="49" charset="0"/>
+              </a:rPr>
+              <a:t>LogisticRegression</a:t>
+            </a:r>
+            <a:r>
+              <a:rPr lang="en-US" altLang="zh-CN" sz="1600" dirty="0">
+                <a:latin typeface="Consolas" panose="020B0609020204030204" pitchFamily="49" charset="0"/>
+              </a:rPr>
+              <a:t>())])</a:t>
+            </a:r>
+          </a:p>
+          <a:p>
+            <a:endParaRPr lang="en-US" altLang="zh-CN" sz="1600" dirty="0">
+              <a:latin typeface="Consolas" panose="020B0609020204030204" pitchFamily="49" charset="0"/>
+            </a:endParaRPr>
+          </a:p>
+          <a:p>
+            <a:r>
+              <a:rPr lang="en-US" altLang="zh-CN" sz="1600" dirty="0">
+                <a:solidFill>
+                  <a:schemeClr val="tx1">
+                    <a:lumMod val="65000"/>
+                    <a:lumOff val="35000"/>
+                  </a:schemeClr>
+                </a:solidFill>
+                <a:latin typeface="Consolas" panose="020B0609020204030204" pitchFamily="49" charset="0"/>
+              </a:rPr>
+              <a:t># how to use </a:t>
+            </a:r>
+            <a:r>
+              <a:rPr lang="en-US" altLang="zh-CN" sz="1600" dirty="0" err="1">
+                <a:solidFill>
+                  <a:schemeClr val="tx1">
+                    <a:lumMod val="65000"/>
+                    <a:lumOff val="35000"/>
+                  </a:schemeClr>
+                </a:solidFill>
+                <a:latin typeface="Consolas" panose="020B0609020204030204" pitchFamily="49" charset="0"/>
+              </a:rPr>
+              <a:t>KFold</a:t>
+            </a:r>
+            <a:endParaRPr lang="en-US" altLang="zh-CN" sz="1600" dirty="0">
+              <a:solidFill>
+                <a:schemeClr val="tx1">
+                  <a:lumMod val="65000"/>
+                  <a:lumOff val="35000"/>
+                </a:schemeClr>
+              </a:solidFill>
+              <a:latin typeface="Consolas" panose="020B0609020204030204" pitchFamily="49" charset="0"/>
+            </a:endParaRPr>
+          </a:p>
+          <a:p>
+            <a:r>
+              <a:rPr lang="en-US" altLang="zh-CN" sz="1600" dirty="0">
+                <a:latin typeface="Consolas" panose="020B0609020204030204" pitchFamily="49" charset="0"/>
+              </a:rPr>
+              <a:t>[10]: </a:t>
+            </a:r>
+            <a:r>
+              <a:rPr lang="en-US" altLang="zh-CN" sz="1600" dirty="0" err="1">
+                <a:latin typeface="Consolas" panose="020B0609020204030204" pitchFamily="49" charset="0"/>
+              </a:rPr>
+              <a:t>kfold</a:t>
+            </a:r>
+            <a:r>
+              <a:rPr lang="en-US" altLang="zh-CN" sz="1600" dirty="0">
+                <a:latin typeface="Consolas" panose="020B0609020204030204" pitchFamily="49" charset="0"/>
+              </a:rPr>
+              <a:t> = </a:t>
+            </a:r>
+            <a:r>
+              <a:rPr lang="en-US" altLang="zh-CN" sz="1600" dirty="0" err="1">
+                <a:latin typeface="Consolas" panose="020B0609020204030204" pitchFamily="49" charset="0"/>
+              </a:rPr>
+              <a:t>KFold</a:t>
+            </a:r>
+            <a:r>
+              <a:rPr lang="en-US" altLang="zh-CN" sz="1600" dirty="0">
+                <a:latin typeface="Consolas" panose="020B0609020204030204" pitchFamily="49" charset="0"/>
+              </a:rPr>
+              <a:t>(</a:t>
+            </a:r>
+            <a:r>
+              <a:rPr lang="en-US" altLang="zh-CN" sz="1600" dirty="0" err="1">
+                <a:latin typeface="Consolas" panose="020B0609020204030204" pitchFamily="49" charset="0"/>
+              </a:rPr>
+              <a:t>n_splits</a:t>
+            </a:r>
+            <a:r>
+              <a:rPr lang="en-US" altLang="zh-CN" sz="1600" dirty="0">
+                <a:latin typeface="Consolas" panose="020B0609020204030204" pitchFamily="49" charset="0"/>
+              </a:rPr>
+              <a:t> = 10)</a:t>
+            </a:r>
+          </a:p>
+          <a:p>
+            <a:r>
+              <a:rPr lang="en-US" altLang="zh-CN" sz="1600" dirty="0">
+                <a:latin typeface="Consolas" panose="020B0609020204030204" pitchFamily="49" charset="0"/>
+              </a:rPr>
+              <a:t>[11]: results = </a:t>
+            </a:r>
+            <a:r>
+              <a:rPr lang="en-US" altLang="zh-CN" sz="1600" dirty="0" err="1">
+                <a:latin typeface="Consolas" panose="020B0609020204030204" pitchFamily="49" charset="0"/>
+              </a:rPr>
+              <a:t>cross_val_score</a:t>
+            </a:r>
+            <a:r>
+              <a:rPr lang="en-US" altLang="zh-CN" sz="1600" dirty="0">
+                <a:latin typeface="Consolas" panose="020B0609020204030204" pitchFamily="49" charset="0"/>
+              </a:rPr>
+              <a:t>(model, X, y, cv = </a:t>
+            </a:r>
+            <a:r>
+              <a:rPr lang="en-US" altLang="zh-CN" sz="1600" dirty="0" err="1">
+                <a:latin typeface="Consolas" panose="020B0609020204030204" pitchFamily="49" charset="0"/>
+              </a:rPr>
+              <a:t>kfold</a:t>
+            </a:r>
+            <a:r>
+              <a:rPr lang="en-US" altLang="zh-CN" sz="1600" dirty="0">
+                <a:latin typeface="Consolas" panose="020B0609020204030204" pitchFamily="49" charset="0"/>
+              </a:rPr>
+              <a:t>)</a:t>
+            </a:r>
+            <a:endParaRPr lang="zh-CN" altLang="en-US" sz="1600" dirty="0">
+              <a:latin typeface="Consolas" panose="020B0609020204030204" pitchFamily="49" charset="0"/>
+            </a:endParaRPr>
+          </a:p>
+        </p:txBody>
+      </p:sp>
+      <p:sp>
+        <p:nvSpPr>
+          <p:cNvPr id="5" name="矩形 4">
+            <a:extLst>
+              <a:ext uri="{FF2B5EF4-FFF2-40B4-BE49-F238E27FC236}">
+                <a16:creationId xmlns:a16="http://schemas.microsoft.com/office/drawing/2014/main" id="{653D003E-76D9-49E8-A5C3-653DCF41639C}"/>
+              </a:ext>
+            </a:extLst>
+          </p:cNvPr>
+          <p:cNvSpPr/>
+          <p:nvPr/>
+        </p:nvSpPr>
+        <p:spPr>
+          <a:xfrm>
+            <a:off x="8294914" y="1401285"/>
+            <a:ext cx="3396343" cy="4812903"/>
+          </a:xfrm>
+          <a:prstGeom prst="rect">
+            <a:avLst/>
+          </a:prstGeom>
+        </p:spPr>
+        <p:style>
+          <a:lnRef idx="2">
+            <a:schemeClr val="accent2">
+              <a:shade val="50000"/>
+            </a:schemeClr>
+          </a:lnRef>
+          <a:fillRef idx="1">
+            <a:schemeClr val="accent2"/>
+          </a:fillRef>
+          <a:effectRef idx="0">
+            <a:schemeClr val="accent2"/>
+          </a:effectRef>
+          <a:fontRef idx="minor">
+            <a:schemeClr val="lt1"/>
+          </a:fontRef>
+        </p:style>
+        <p:txBody>
+          <a:bodyPr rtlCol="0" anchor="ctr"/>
+          <a:lstStyle/>
+          <a:p>
+            <a:pPr marL="285750" indent="-285750">
+              <a:buFont typeface="Arial" panose="020B0604020202020204" pitchFamily="34" charset="0"/>
+              <a:buChar char="•"/>
+            </a:pPr>
+            <a:r>
+              <a:rPr lang="en-US" altLang="zh-CN" sz="2400" b="1" dirty="0">
+                <a:solidFill>
+                  <a:schemeClr val="tx1"/>
+                </a:solidFill>
+              </a:rPr>
+              <a:t>Procedure</a:t>
+            </a:r>
+          </a:p>
+          <a:p>
+            <a:pPr marL="285750" indent="-285750">
+              <a:buFont typeface="Arial" panose="020B0604020202020204" pitchFamily="34" charset="0"/>
+              <a:buChar char="•"/>
+            </a:pPr>
+            <a:endParaRPr lang="en-US" altLang="zh-CN" sz="2400" b="1" dirty="0">
+              <a:solidFill>
+                <a:schemeClr val="tx1"/>
+              </a:solidFill>
+            </a:endParaRPr>
+          </a:p>
+          <a:p>
+            <a:pPr marL="800100" lvl="1" indent="-342900">
+              <a:buFont typeface="+mj-lt"/>
+              <a:buAutoNum type="arabicPeriod"/>
+            </a:pPr>
+            <a:r>
+              <a:rPr lang="en-US" altLang="zh-CN" b="1" dirty="0">
+                <a:solidFill>
+                  <a:schemeClr val="tx1"/>
+                </a:solidFill>
+              </a:rPr>
+              <a:t>Create model</a:t>
+            </a:r>
+          </a:p>
+          <a:p>
+            <a:pPr marL="800100" lvl="1" indent="-342900">
+              <a:buFont typeface="+mj-lt"/>
+              <a:buAutoNum type="arabicPeriod"/>
+            </a:pPr>
+            <a:r>
+              <a:rPr lang="en-US" altLang="zh-CN" b="1" dirty="0">
+                <a:solidFill>
+                  <a:schemeClr val="tx1"/>
+                </a:solidFill>
+              </a:rPr>
+              <a:t>Claim </a:t>
+            </a:r>
+            <a:r>
+              <a:rPr lang="en-US" altLang="zh-CN" b="1" dirty="0" err="1">
+                <a:solidFill>
+                  <a:schemeClr val="tx1"/>
+                </a:solidFill>
+              </a:rPr>
+              <a:t>kfold</a:t>
+            </a:r>
+            <a:endParaRPr lang="en-US" altLang="zh-CN" b="1" dirty="0">
+              <a:solidFill>
+                <a:schemeClr val="tx1"/>
+              </a:solidFill>
+            </a:endParaRPr>
+          </a:p>
+          <a:p>
+            <a:pPr marL="800100" lvl="1" indent="-342900">
+              <a:buFont typeface="+mj-lt"/>
+              <a:buAutoNum type="arabicPeriod"/>
+            </a:pPr>
+            <a:r>
+              <a:rPr lang="en-US" altLang="zh-CN" b="1" dirty="0">
+                <a:solidFill>
+                  <a:schemeClr val="tx1"/>
+                </a:solidFill>
+              </a:rPr>
+              <a:t>Fit and test in one line</a:t>
+            </a:r>
+            <a:endParaRPr lang="zh-CN" altLang="en-US" b="1" dirty="0">
+              <a:solidFill>
+                <a:schemeClr val="tx1"/>
+              </a:solidFill>
+            </a:endParaRPr>
+          </a:p>
+        </p:txBody>
+      </p:sp>
+    </p:spTree>
+    <p:extLst>
+      <p:ext uri="{BB962C8B-B14F-4D97-AF65-F5344CB8AC3E}">
+        <p14:creationId xmlns:p14="http://schemas.microsoft.com/office/powerpoint/2010/main" val="3238172030"/>
+      </p:ext>
+    </p:extLst>
+  </p:cSld>
+  <p:clrMapOvr>
+    <a:masterClrMapping/>
+  </p:clrMapOvr>
+</p:sld>
+</file>
+
 <file path=ppt/theme/theme1.xml><?xml version="1.0" encoding="utf-8"?>
 <a:theme xmlns:a="http://schemas.openxmlformats.org/drawingml/2006/main" name="Office 主题​​">
   <a:themeElements>

</xml_diff>